<commit_message>
updated distributed random forest
</commit_message>
<xml_diff>
--- a/mahout/DistributedRandomForest.pptx
+++ b/mahout/DistributedRandomForest.pptx
@@ -2932,27 +2932,27 @@
     </dgm:pt>
   </dgm:ptLst>
   <dgm:cxnLst>
+    <dgm:cxn modelId="{D5E6F969-8DD0-4E93-8E98-B8368DBA2A3E}" type="presOf" srcId="{200893BF-FCBB-4088-AEC9-7F6DFA8D68F7}" destId="{051916FE-5180-493A-AA2D-DDBE89A85E06}" srcOrd="0" destOrd="0" presId="urn:microsoft.com/office/officeart/2009/layout/CirclePictureHierarchy"/>
+    <dgm:cxn modelId="{69610595-DB14-4FC3-9690-0C1AE6987A5F}" type="presOf" srcId="{87B8E672-FEBE-4AF5-B51C-8B7D044D403B}" destId="{407E8BB6-E560-4F62-A31C-A5646207D124}" srcOrd="0" destOrd="0" presId="urn:microsoft.com/office/officeart/2009/layout/CirclePictureHierarchy"/>
+    <dgm:cxn modelId="{88B86BF0-1039-4F28-9FC3-CD408573678A}" type="presOf" srcId="{5C41DD03-9331-419B-9855-DF7C91276897}" destId="{2815722D-0EBC-49D3-8390-3DC849E84BBA}" srcOrd="0" destOrd="0" presId="urn:microsoft.com/office/officeart/2009/layout/CirclePictureHierarchy"/>
+    <dgm:cxn modelId="{CA688F96-9AFC-48AF-9A94-A77115D97E98}" srcId="{F8839626-05E1-4B9D-9101-EC7C6A989CA3}" destId="{69216770-C173-4541-9FDA-920D51F78E7A}" srcOrd="0" destOrd="0" parTransId="{CCC97E95-820E-4335-86CF-6D2E1E96E843}" sibTransId="{83213DA9-BD0C-4172-A5C3-B7569F1F58F4}"/>
+    <dgm:cxn modelId="{53AB13BC-DC01-47D0-AD0B-45A10BAD5AF4}" srcId="{F8839626-05E1-4B9D-9101-EC7C6A989CA3}" destId="{DF09F539-ABA8-42F8-9880-4EF32ADD4E80}" srcOrd="1" destOrd="0" parTransId="{5125AA39-56FF-4B1B-99CA-4AE605FE3016}" sibTransId="{25648899-E3A9-488E-A4BA-7B553032F984}"/>
+    <dgm:cxn modelId="{226598A5-381E-4D34-9703-294C47E0D3C0}" srcId="{DF09F539-ABA8-42F8-9880-4EF32ADD4E80}" destId="{5C41DD03-9331-419B-9855-DF7C91276897}" srcOrd="0" destOrd="0" parTransId="{93AE1CB4-E4E9-43D7-B28F-E87535C5B0DB}" sibTransId="{2E48D23F-9393-4CEB-8E9E-1B30C3126CCB}"/>
+    <dgm:cxn modelId="{D6B2AA0A-D2E5-4AB3-ADBE-7F6E2E2FA7EB}" type="presOf" srcId="{CCC97E95-820E-4335-86CF-6D2E1E96E843}" destId="{87E9779C-5185-4037-AFE1-F0D791495E84}" srcOrd="0" destOrd="0" presId="urn:microsoft.com/office/officeart/2009/layout/CirclePictureHierarchy"/>
+    <dgm:cxn modelId="{B3BE36F7-93AE-4DC9-BA74-4F83323FFB80}" type="presOf" srcId="{9B5B60B2-C0AC-400F-A6AA-63199A30EFC6}" destId="{CF2F7101-7D07-48E5-8681-F9BAFB818341}" srcOrd="0" destOrd="0" presId="urn:microsoft.com/office/officeart/2009/layout/CirclePictureHierarchy"/>
+    <dgm:cxn modelId="{355A515E-AD9A-44E7-B4AE-87D74F638AE2}" srcId="{DF09F539-ABA8-42F8-9880-4EF32ADD4E80}" destId="{02C4EA76-65F7-4328-B810-D8FBCDBD9C22}" srcOrd="1" destOrd="0" parTransId="{A70A88B5-3D3B-4D01-9371-EE0842B1E0C0}" sibTransId="{8BEF8824-CFD7-4A71-898C-82A48A8DE7B1}"/>
+    <dgm:cxn modelId="{B514FFA7-CBA5-44BC-8551-EA39FF039778}" type="presOf" srcId="{93AE1CB4-E4E9-43D7-B28F-E87535C5B0DB}" destId="{71D94F96-2751-4EB9-909A-CA2543CC0DA6}" srcOrd="0" destOrd="0" presId="urn:microsoft.com/office/officeart/2009/layout/CirclePictureHierarchy"/>
+    <dgm:cxn modelId="{34CB0ED7-5524-4B35-8537-F76F17418163}" srcId="{69216770-C173-4541-9FDA-920D51F78E7A}" destId="{87B8E672-FEBE-4AF5-B51C-8B7D044D403B}" srcOrd="0" destOrd="0" parTransId="{9B5B60B2-C0AC-400F-A6AA-63199A30EFC6}" sibTransId="{48D9FE59-5249-4FA9-A8B7-4BAC58F4F96D}"/>
+    <dgm:cxn modelId="{5EA9656C-996A-439C-9FC3-81476BEB426B}" srcId="{95F4B0C0-340A-47B0-A58E-91C110142394}" destId="{F8839626-05E1-4B9D-9101-EC7C6A989CA3}" srcOrd="0" destOrd="0" parTransId="{11912C8E-5B6C-4CD2-982F-081706A630F2}" sibTransId="{7D22A185-8B85-4732-911C-C301FFF3AA2D}"/>
+    <dgm:cxn modelId="{1E35DD92-4508-4645-899D-F36DBD74DCDE}" type="presOf" srcId="{95F4B0C0-340A-47B0-A58E-91C110142394}" destId="{9521567C-0856-41E6-B3DF-CA557CA8EEA6}" srcOrd="0" destOrd="0" presId="urn:microsoft.com/office/officeart/2009/layout/CirclePictureHierarchy"/>
+    <dgm:cxn modelId="{202CB4BD-EDFA-49F7-831C-E41AD40CC52B}" type="presOf" srcId="{A70A88B5-3D3B-4D01-9371-EE0842B1E0C0}" destId="{5CB95565-D6F9-461A-8676-A20B4A1E9498}" srcOrd="0" destOrd="0" presId="urn:microsoft.com/office/officeart/2009/layout/CirclePictureHierarchy"/>
+    <dgm:cxn modelId="{94E66EB7-66F1-49D2-8697-DDD55B421706}" type="presOf" srcId="{02C4EA76-65F7-4328-B810-D8FBCDBD9C22}" destId="{F8797928-B3AF-42E3-B69E-0C186D06ED55}" srcOrd="0" destOrd="0" presId="urn:microsoft.com/office/officeart/2009/layout/CirclePictureHierarchy"/>
+    <dgm:cxn modelId="{4F0DC568-F08A-4A49-A80F-963E55033201}" type="presOf" srcId="{5125AA39-56FF-4B1B-99CA-4AE605FE3016}" destId="{25087BEE-EE8E-4D79-8C9B-31A0A1BFE7E0}" srcOrd="0" destOrd="0" presId="urn:microsoft.com/office/officeart/2009/layout/CirclePictureHierarchy"/>
+    <dgm:cxn modelId="{6AFEDCEA-C610-47F7-B288-3B48F3972214}" type="presOf" srcId="{CCF4E173-165E-4375-94D3-1D1F229C9344}" destId="{FB50D33F-00B6-461A-A465-13DD9484C31F}" srcOrd="0" destOrd="0" presId="urn:microsoft.com/office/officeart/2009/layout/CirclePictureHierarchy"/>
+    <dgm:cxn modelId="{578372E8-BEA3-4935-80CC-A4B8DA7AEC51}" srcId="{69216770-C173-4541-9FDA-920D51F78E7A}" destId="{CCF4E173-165E-4375-94D3-1D1F229C9344}" srcOrd="1" destOrd="0" parTransId="{200893BF-FCBB-4088-AEC9-7F6DFA8D68F7}" sibTransId="{A530498E-A0DE-4AF1-9BE6-36594908A067}"/>
+    <dgm:cxn modelId="{32C949AA-1115-4E21-97A2-7B8629FD305E}" type="presOf" srcId="{69216770-C173-4541-9FDA-920D51F78E7A}" destId="{938A348B-A7DE-4998-A694-22EE8FA22BE8}" srcOrd="0" destOrd="0" presId="urn:microsoft.com/office/officeart/2009/layout/CirclePictureHierarchy"/>
+    <dgm:cxn modelId="{E9080D64-377A-4902-9C38-3232F8EBF790}" type="presOf" srcId="{DF09F539-ABA8-42F8-9880-4EF32ADD4E80}" destId="{0D6DFE80-FEF3-437E-B0A0-628CC3FE721B}" srcOrd="0" destOrd="0" presId="urn:microsoft.com/office/officeart/2009/layout/CirclePictureHierarchy"/>
     <dgm:cxn modelId="{CD44D02E-8E95-4EDA-81EE-8F682CE0427A}" type="presOf" srcId="{F8839626-05E1-4B9D-9101-EC7C6A989CA3}" destId="{A4124336-0109-45B1-8EA9-BE6E34F4EF8F}" srcOrd="0" destOrd="0" presId="urn:microsoft.com/office/officeart/2009/layout/CirclePictureHierarchy"/>
-    <dgm:cxn modelId="{202CB4BD-EDFA-49F7-831C-E41AD40CC52B}" type="presOf" srcId="{A70A88B5-3D3B-4D01-9371-EE0842B1E0C0}" destId="{5CB95565-D6F9-461A-8676-A20B4A1E9498}" srcOrd="0" destOrd="0" presId="urn:microsoft.com/office/officeart/2009/layout/CirclePictureHierarchy"/>
-    <dgm:cxn modelId="{4F0DC568-F08A-4A49-A80F-963E55033201}" type="presOf" srcId="{5125AA39-56FF-4B1B-99CA-4AE605FE3016}" destId="{25087BEE-EE8E-4D79-8C9B-31A0A1BFE7E0}" srcOrd="0" destOrd="0" presId="urn:microsoft.com/office/officeart/2009/layout/CirclePictureHierarchy"/>
-    <dgm:cxn modelId="{226598A5-381E-4D34-9703-294C47E0D3C0}" srcId="{DF09F539-ABA8-42F8-9880-4EF32ADD4E80}" destId="{5C41DD03-9331-419B-9855-DF7C91276897}" srcOrd="0" destOrd="0" parTransId="{93AE1CB4-E4E9-43D7-B28F-E87535C5B0DB}" sibTransId="{2E48D23F-9393-4CEB-8E9E-1B30C3126CCB}"/>
-    <dgm:cxn modelId="{5EA9656C-996A-439C-9FC3-81476BEB426B}" srcId="{95F4B0C0-340A-47B0-A58E-91C110142394}" destId="{F8839626-05E1-4B9D-9101-EC7C6A989CA3}" srcOrd="0" destOrd="0" parTransId="{11912C8E-5B6C-4CD2-982F-081706A630F2}" sibTransId="{7D22A185-8B85-4732-911C-C301FFF3AA2D}"/>
-    <dgm:cxn modelId="{32C949AA-1115-4E21-97A2-7B8629FD305E}" type="presOf" srcId="{69216770-C173-4541-9FDA-920D51F78E7A}" destId="{938A348B-A7DE-4998-A694-22EE8FA22BE8}" srcOrd="0" destOrd="0" presId="urn:microsoft.com/office/officeart/2009/layout/CirclePictureHierarchy"/>
-    <dgm:cxn modelId="{D5E6F969-8DD0-4E93-8E98-B8368DBA2A3E}" type="presOf" srcId="{200893BF-FCBB-4088-AEC9-7F6DFA8D68F7}" destId="{051916FE-5180-493A-AA2D-DDBE89A85E06}" srcOrd="0" destOrd="0" presId="urn:microsoft.com/office/officeart/2009/layout/CirclePictureHierarchy"/>
-    <dgm:cxn modelId="{88B86BF0-1039-4F28-9FC3-CD408573678A}" type="presOf" srcId="{5C41DD03-9331-419B-9855-DF7C91276897}" destId="{2815722D-0EBC-49D3-8390-3DC849E84BBA}" srcOrd="0" destOrd="0" presId="urn:microsoft.com/office/officeart/2009/layout/CirclePictureHierarchy"/>
-    <dgm:cxn modelId="{D6B2AA0A-D2E5-4AB3-ADBE-7F6E2E2FA7EB}" type="presOf" srcId="{CCC97E95-820E-4335-86CF-6D2E1E96E843}" destId="{87E9779C-5185-4037-AFE1-F0D791495E84}" srcOrd="0" destOrd="0" presId="urn:microsoft.com/office/officeart/2009/layout/CirclePictureHierarchy"/>
-    <dgm:cxn modelId="{34CB0ED7-5524-4B35-8537-F76F17418163}" srcId="{69216770-C173-4541-9FDA-920D51F78E7A}" destId="{87B8E672-FEBE-4AF5-B51C-8B7D044D403B}" srcOrd="0" destOrd="0" parTransId="{9B5B60B2-C0AC-400F-A6AA-63199A30EFC6}" sibTransId="{48D9FE59-5249-4FA9-A8B7-4BAC58F4F96D}"/>
-    <dgm:cxn modelId="{355A515E-AD9A-44E7-B4AE-87D74F638AE2}" srcId="{DF09F539-ABA8-42F8-9880-4EF32ADD4E80}" destId="{02C4EA76-65F7-4328-B810-D8FBCDBD9C22}" srcOrd="1" destOrd="0" parTransId="{A70A88B5-3D3B-4D01-9371-EE0842B1E0C0}" sibTransId="{8BEF8824-CFD7-4A71-898C-82A48A8DE7B1}"/>
-    <dgm:cxn modelId="{578372E8-BEA3-4935-80CC-A4B8DA7AEC51}" srcId="{69216770-C173-4541-9FDA-920D51F78E7A}" destId="{CCF4E173-165E-4375-94D3-1D1F229C9344}" srcOrd="1" destOrd="0" parTransId="{200893BF-FCBB-4088-AEC9-7F6DFA8D68F7}" sibTransId="{A530498E-A0DE-4AF1-9BE6-36594908A067}"/>
-    <dgm:cxn modelId="{94E66EB7-66F1-49D2-8697-DDD55B421706}" type="presOf" srcId="{02C4EA76-65F7-4328-B810-D8FBCDBD9C22}" destId="{F8797928-B3AF-42E3-B69E-0C186D06ED55}" srcOrd="0" destOrd="0" presId="urn:microsoft.com/office/officeart/2009/layout/CirclePictureHierarchy"/>
-    <dgm:cxn modelId="{B3BE36F7-93AE-4DC9-BA74-4F83323FFB80}" type="presOf" srcId="{9B5B60B2-C0AC-400F-A6AA-63199A30EFC6}" destId="{CF2F7101-7D07-48E5-8681-F9BAFB818341}" srcOrd="0" destOrd="0" presId="urn:microsoft.com/office/officeart/2009/layout/CirclePictureHierarchy"/>
-    <dgm:cxn modelId="{53AB13BC-DC01-47D0-AD0B-45A10BAD5AF4}" srcId="{F8839626-05E1-4B9D-9101-EC7C6A989CA3}" destId="{DF09F539-ABA8-42F8-9880-4EF32ADD4E80}" srcOrd="1" destOrd="0" parTransId="{5125AA39-56FF-4B1B-99CA-4AE605FE3016}" sibTransId="{25648899-E3A9-488E-A4BA-7B553032F984}"/>
-    <dgm:cxn modelId="{E9080D64-377A-4902-9C38-3232F8EBF790}" type="presOf" srcId="{DF09F539-ABA8-42F8-9880-4EF32ADD4E80}" destId="{0D6DFE80-FEF3-437E-B0A0-628CC3FE721B}" srcOrd="0" destOrd="0" presId="urn:microsoft.com/office/officeart/2009/layout/CirclePictureHierarchy"/>
-    <dgm:cxn modelId="{CA688F96-9AFC-48AF-9A94-A77115D97E98}" srcId="{F8839626-05E1-4B9D-9101-EC7C6A989CA3}" destId="{69216770-C173-4541-9FDA-920D51F78E7A}" srcOrd="0" destOrd="0" parTransId="{CCC97E95-820E-4335-86CF-6D2E1E96E843}" sibTransId="{83213DA9-BD0C-4172-A5C3-B7569F1F58F4}"/>
-    <dgm:cxn modelId="{69610595-DB14-4FC3-9690-0C1AE6987A5F}" type="presOf" srcId="{87B8E672-FEBE-4AF5-B51C-8B7D044D403B}" destId="{407E8BB6-E560-4F62-A31C-A5646207D124}" srcOrd="0" destOrd="0" presId="urn:microsoft.com/office/officeart/2009/layout/CirclePictureHierarchy"/>
-    <dgm:cxn modelId="{B514FFA7-CBA5-44BC-8551-EA39FF039778}" type="presOf" srcId="{93AE1CB4-E4E9-43D7-B28F-E87535C5B0DB}" destId="{71D94F96-2751-4EB9-909A-CA2543CC0DA6}" srcOrd="0" destOrd="0" presId="urn:microsoft.com/office/officeart/2009/layout/CirclePictureHierarchy"/>
-    <dgm:cxn modelId="{6AFEDCEA-C610-47F7-B288-3B48F3972214}" type="presOf" srcId="{CCF4E173-165E-4375-94D3-1D1F229C9344}" destId="{FB50D33F-00B6-461A-A465-13DD9484C31F}" srcOrd="0" destOrd="0" presId="urn:microsoft.com/office/officeart/2009/layout/CirclePictureHierarchy"/>
-    <dgm:cxn modelId="{1E35DD92-4508-4645-899D-F36DBD74DCDE}" type="presOf" srcId="{95F4B0C0-340A-47B0-A58E-91C110142394}" destId="{9521567C-0856-41E6-B3DF-CA557CA8EEA6}" srcOrd="0" destOrd="0" presId="urn:microsoft.com/office/officeart/2009/layout/CirclePictureHierarchy"/>
     <dgm:cxn modelId="{8F9C91EE-4506-46A8-BB0D-D8F1C1A0E3D4}" type="presParOf" srcId="{9521567C-0856-41E6-B3DF-CA557CA8EEA6}" destId="{F10863F7-4973-44DF-94F5-F5005627BC66}" srcOrd="0" destOrd="0" presId="urn:microsoft.com/office/officeart/2009/layout/CirclePictureHierarchy"/>
     <dgm:cxn modelId="{AA64CCD9-34F8-42C1-B491-A8DAA80A6F2B}" type="presParOf" srcId="{F10863F7-4973-44DF-94F5-F5005627BC66}" destId="{F77E16A7-4B5C-445F-BF86-FBA6A786BDCB}" srcOrd="0" destOrd="0" presId="urn:microsoft.com/office/officeart/2009/layout/CirclePictureHierarchy"/>
     <dgm:cxn modelId="{0EDCF444-7094-48F9-8E75-87D55FEAE5FB}" type="presParOf" srcId="{F77E16A7-4B5C-445F-BF86-FBA6A786BDCB}" destId="{36C187BF-792A-4C9D-9623-43C966FAAA1D}" srcOrd="0" destOrd="0" presId="urn:microsoft.com/office/officeart/2009/layout/CirclePictureHierarchy"/>
@@ -12512,7 +12512,7 @@
           <a:p>
             <a:fld id="{3EE31E7D-7911-4ACB-A8DC-3C93F2E95EF1}" type="datetimeFigureOut">
               <a:rPr lang="en-US" smtClean="0"/>
-              <a:t>9/2/2015</a:t>
+              <a:t>9/17/2015</a:t>
             </a:fld>
             <a:endParaRPr lang="en-US"/>
           </a:p>
@@ -12682,7 +12682,7 @@
           <a:p>
             <a:fld id="{3EE31E7D-7911-4ACB-A8DC-3C93F2E95EF1}" type="datetimeFigureOut">
               <a:rPr lang="en-US" smtClean="0"/>
-              <a:t>9/2/2015</a:t>
+              <a:t>9/17/2015</a:t>
             </a:fld>
             <a:endParaRPr lang="en-US"/>
           </a:p>
@@ -12862,7 +12862,7 @@
           <a:p>
             <a:fld id="{3EE31E7D-7911-4ACB-A8DC-3C93F2E95EF1}" type="datetimeFigureOut">
               <a:rPr lang="en-US" smtClean="0"/>
-              <a:t>9/2/2015</a:t>
+              <a:t>9/17/2015</a:t>
             </a:fld>
             <a:endParaRPr lang="en-US"/>
           </a:p>
@@ -13032,7 +13032,7 @@
           <a:p>
             <a:fld id="{3EE31E7D-7911-4ACB-A8DC-3C93F2E95EF1}" type="datetimeFigureOut">
               <a:rPr lang="en-US" smtClean="0"/>
-              <a:t>9/2/2015</a:t>
+              <a:t>9/17/2015</a:t>
             </a:fld>
             <a:endParaRPr lang="en-US"/>
           </a:p>
@@ -13278,7 +13278,7 @@
           <a:p>
             <a:fld id="{3EE31E7D-7911-4ACB-A8DC-3C93F2E95EF1}" type="datetimeFigureOut">
               <a:rPr lang="en-US" smtClean="0"/>
-              <a:t>9/2/2015</a:t>
+              <a:t>9/17/2015</a:t>
             </a:fld>
             <a:endParaRPr lang="en-US"/>
           </a:p>
@@ -13510,7 +13510,7 @@
           <a:p>
             <a:fld id="{3EE31E7D-7911-4ACB-A8DC-3C93F2E95EF1}" type="datetimeFigureOut">
               <a:rPr lang="en-US" smtClean="0"/>
-              <a:t>9/2/2015</a:t>
+              <a:t>9/17/2015</a:t>
             </a:fld>
             <a:endParaRPr lang="en-US"/>
           </a:p>
@@ -13877,7 +13877,7 @@
           <a:p>
             <a:fld id="{3EE31E7D-7911-4ACB-A8DC-3C93F2E95EF1}" type="datetimeFigureOut">
               <a:rPr lang="en-US" smtClean="0"/>
-              <a:t>9/2/2015</a:t>
+              <a:t>9/17/2015</a:t>
             </a:fld>
             <a:endParaRPr lang="en-US"/>
           </a:p>
@@ -13995,7 +13995,7 @@
           <a:p>
             <a:fld id="{3EE31E7D-7911-4ACB-A8DC-3C93F2E95EF1}" type="datetimeFigureOut">
               <a:rPr lang="en-US" smtClean="0"/>
-              <a:t>9/2/2015</a:t>
+              <a:t>9/17/2015</a:t>
             </a:fld>
             <a:endParaRPr lang="en-US"/>
           </a:p>
@@ -14090,7 +14090,7 @@
           <a:p>
             <a:fld id="{3EE31E7D-7911-4ACB-A8DC-3C93F2E95EF1}" type="datetimeFigureOut">
               <a:rPr lang="en-US" smtClean="0"/>
-              <a:t>9/2/2015</a:t>
+              <a:t>9/17/2015</a:t>
             </a:fld>
             <a:endParaRPr lang="en-US"/>
           </a:p>
@@ -14367,7 +14367,7 @@
           <a:p>
             <a:fld id="{3EE31E7D-7911-4ACB-A8DC-3C93F2E95EF1}" type="datetimeFigureOut">
               <a:rPr lang="en-US" smtClean="0"/>
-              <a:t>9/2/2015</a:t>
+              <a:t>9/17/2015</a:t>
             </a:fld>
             <a:endParaRPr lang="en-US"/>
           </a:p>
@@ -14620,7 +14620,7 @@
           <a:p>
             <a:fld id="{3EE31E7D-7911-4ACB-A8DC-3C93F2E95EF1}" type="datetimeFigureOut">
               <a:rPr lang="en-US" smtClean="0"/>
-              <a:t>9/2/2015</a:t>
+              <a:t>9/17/2015</a:t>
             </a:fld>
             <a:endParaRPr lang="en-US"/>
           </a:p>
@@ -14833,7 +14833,7 @@
           <a:p>
             <a:fld id="{3EE31E7D-7911-4ACB-A8DC-3C93F2E95EF1}" type="datetimeFigureOut">
               <a:rPr lang="en-US" smtClean="0"/>
-              <a:t>9/2/2015</a:t>
+              <a:t>9/17/2015</a:t>
             </a:fld>
             <a:endParaRPr lang="en-US"/>
           </a:p>

</xml_diff>